<commit_message>
Different ways of Data Source
</commit_message>
<xml_diff>
--- a/15_Ch06_API_c.pptx
+++ b/15_Ch06_API_c.pptx
@@ -227,7 +227,7 @@
             <a:fld id="{6837EDA8-41C8-4B24-A206-13C08A65A6D7}" type="datetimeFigureOut">
               <a:rPr lang="zh-TW" altLang="en-US" smtClean="0"/>
               <a:pPr/>
-              <a:t>2019/1/7</a:t>
+              <a:t>2019/1/8</a:t>
             </a:fld>
             <a:endParaRPr lang="zh-TW" altLang="en-US"/>
           </a:p>
@@ -680,7 +680,7 @@
             <a:fld id="{8B85509C-BD4F-47BF-9B1E-FC2E949B3621}" type="datetime1">
               <a:rPr lang="zh-TW" altLang="en-US" smtClean="0"/>
               <a:pPr/>
-              <a:t>2019/1/7</a:t>
+              <a:t>2019/1/8</a:t>
             </a:fld>
             <a:endParaRPr lang="zh-TW" altLang="en-US"/>
           </a:p>
@@ -853,7 +853,7 @@
             <a:fld id="{42251B24-F787-4C15-8A0F-7AEC20C70069}" type="datetime1">
               <a:rPr lang="zh-TW" altLang="en-US" smtClean="0"/>
               <a:pPr/>
-              <a:t>2019/1/7</a:t>
+              <a:t>2019/1/8</a:t>
             </a:fld>
             <a:endParaRPr lang="zh-TW" altLang="en-US"/>
           </a:p>
@@ -1028,7 +1028,7 @@
             <a:fld id="{9CA0D33C-CE2B-45F1-B8D4-FFD1F131F331}" type="datetime1">
               <a:rPr lang="zh-TW" altLang="en-US" smtClean="0"/>
               <a:pPr/>
-              <a:t>2019/1/7</a:t>
+              <a:t>2019/1/8</a:t>
             </a:fld>
             <a:endParaRPr lang="zh-TW" altLang="en-US"/>
           </a:p>
@@ -1193,7 +1193,7 @@
             <a:fld id="{50B99440-D9EF-40CC-9B52-F6428D9B2C76}" type="datetime1">
               <a:rPr lang="zh-TW" altLang="en-US" smtClean="0"/>
               <a:pPr/>
-              <a:t>2019/1/7</a:t>
+              <a:t>2019/1/8</a:t>
             </a:fld>
             <a:endParaRPr lang="zh-TW" altLang="en-US"/>
           </a:p>
@@ -1435,7 +1435,7 @@
             <a:fld id="{0871BF52-5C6C-4959-8E27-CECB68D39FE4}" type="datetime1">
               <a:rPr lang="zh-TW" altLang="en-US" smtClean="0"/>
               <a:pPr/>
-              <a:t>2019/1/7</a:t>
+              <a:t>2019/1/8</a:t>
             </a:fld>
             <a:endParaRPr lang="zh-TW" altLang="en-US"/>
           </a:p>
@@ -1717,7 +1717,7 @@
             <a:fld id="{DF863F05-2DD9-4EB1-A827-12FD992DE9DC}" type="datetime1">
               <a:rPr lang="zh-TW" altLang="en-US" smtClean="0"/>
               <a:pPr/>
-              <a:t>2019/1/7</a:t>
+              <a:t>2019/1/8</a:t>
             </a:fld>
             <a:endParaRPr lang="zh-TW" altLang="en-US"/>
           </a:p>
@@ -2133,7 +2133,7 @@
             <a:fld id="{6339AF51-4491-4873-A096-75DB6CE47516}" type="datetime1">
               <a:rPr lang="zh-TW" altLang="en-US" smtClean="0"/>
               <a:pPr/>
-              <a:t>2019/1/7</a:t>
+              <a:t>2019/1/8</a:t>
             </a:fld>
             <a:endParaRPr lang="zh-TW" altLang="en-US"/>
           </a:p>
@@ -2247,7 +2247,7 @@
             <a:fld id="{EE4AD9C8-8B9E-40FF-ABE2-858AC2057BBB}" type="datetime1">
               <a:rPr lang="zh-TW" altLang="en-US" smtClean="0"/>
               <a:pPr/>
-              <a:t>2019/1/7</a:t>
+              <a:t>2019/1/8</a:t>
             </a:fld>
             <a:endParaRPr lang="zh-TW" altLang="en-US"/>
           </a:p>
@@ -2339,7 +2339,7 @@
             <a:fld id="{B4784999-BBBE-4BE4-A8D0-877E7D1D66CC}" type="datetime1">
               <a:rPr lang="zh-TW" altLang="en-US" smtClean="0"/>
               <a:pPr/>
-              <a:t>2019/1/7</a:t>
+              <a:t>2019/1/8</a:t>
             </a:fld>
             <a:endParaRPr lang="zh-TW" altLang="en-US"/>
           </a:p>
@@ -2611,7 +2611,7 @@
             <a:fld id="{E88D17E6-02BD-4944-B9FE-7BFCCBF83D48}" type="datetime1">
               <a:rPr lang="zh-TW" altLang="en-US" smtClean="0"/>
               <a:pPr/>
-              <a:t>2019/1/7</a:t>
+              <a:t>2019/1/8</a:t>
             </a:fld>
             <a:endParaRPr lang="zh-TW" altLang="en-US"/>
           </a:p>
@@ -2860,7 +2860,7 @@
             <a:fld id="{3C13E23D-1FEF-4D78-A3A3-3D6F2BB31954}" type="datetime1">
               <a:rPr lang="zh-TW" altLang="en-US" smtClean="0"/>
               <a:pPr/>
-              <a:t>2019/1/7</a:t>
+              <a:t>2019/1/8</a:t>
             </a:fld>
             <a:endParaRPr lang="zh-TW" altLang="en-US"/>
           </a:p>
@@ -3068,7 +3068,7 @@
             <a:fld id="{06197F35-AD6F-4594-8B50-334492D2E7E8}" type="datetime1">
               <a:rPr lang="zh-TW" altLang="en-US" smtClean="0"/>
               <a:pPr/>
-              <a:t>2019/1/7</a:t>
+              <a:t>2019/1/8</a:t>
             </a:fld>
             <a:endParaRPr lang="zh-TW" altLang="en-US"/>
           </a:p>
@@ -3529,7 +3529,7 @@
             <a:fld id="{C389EDC9-19E3-47AC-9C57-C6A24DEA81AD}" type="datetime1">
               <a:rPr lang="zh-TW" altLang="en-US" smtClean="0"/>
               <a:pPr/>
-              <a:t>2019/1/7</a:t>
+              <a:t>2019/1/8</a:t>
             </a:fld>
             <a:endParaRPr lang="zh-TW" altLang="en-US"/>
           </a:p>
@@ -3869,7 +3869,7 @@
             <a:fld id="{A4F910E6-8D00-4BAF-8C48-9688E0B449D3}" type="datetime1">
               <a:rPr lang="zh-TW" altLang="en-US" smtClean="0"/>
               <a:pPr/>
-              <a:t>2019/1/7</a:t>
+              <a:t>2019/1/8</a:t>
             </a:fld>
             <a:endParaRPr lang="zh-TW" altLang="en-US"/>
           </a:p>
@@ -4364,7 +4364,7 @@
             <a:fld id="{A4F910E6-8D00-4BAF-8C48-9688E0B449D3}" type="datetime1">
               <a:rPr lang="zh-TW" altLang="en-US" smtClean="0"/>
               <a:pPr/>
-              <a:t>2019/1/7</a:t>
+              <a:t>2019/1/8</a:t>
             </a:fld>
             <a:endParaRPr lang="zh-TW" altLang="en-US"/>
           </a:p>
@@ -4663,7 +4663,7 @@
             <a:fld id="{C389EDC9-19E3-47AC-9C57-C6A24DEA81AD}" type="datetime1">
               <a:rPr lang="zh-TW" altLang="en-US" smtClean="0"/>
               <a:pPr/>
-              <a:t>2019/1/7</a:t>
+              <a:t>2019/1/8</a:t>
             </a:fld>
             <a:endParaRPr lang="zh-TW" altLang="en-US"/>
           </a:p>
@@ -4982,7 +4982,7 @@
             <a:fld id="{A4F910E6-8D00-4BAF-8C48-9688E0B449D3}" type="datetime1">
               <a:rPr lang="zh-TW" altLang="en-US" smtClean="0"/>
               <a:pPr/>
-              <a:t>2019/1/7</a:t>
+              <a:t>2019/1/8</a:t>
             </a:fld>
             <a:endParaRPr lang="zh-TW" altLang="en-US"/>
           </a:p>
@@ -5556,7 +5556,7 @@
             <a:fld id="{A4F910E6-8D00-4BAF-8C48-9688E0B449D3}" type="datetime1">
               <a:rPr lang="zh-TW" altLang="en-US" smtClean="0"/>
               <a:pPr/>
-              <a:t>2019/1/7</a:t>
+              <a:t>2019/1/8</a:t>
             </a:fld>
             <a:endParaRPr lang="zh-TW" altLang="en-US"/>
           </a:p>
@@ -5827,7 +5827,15 @@
                   <a:srgbClr val="FFFF00"/>
                 </a:solidFill>
               </a:rPr>
-              <a:t>6.6 API: customization</a:t>
+              <a:t>6.6 API: </a:t>
+            </a:r>
+            <a:r>
+              <a:rPr lang="en-US" altLang="zh-TW" sz="4800" b="1" dirty="0" err="1">
+                <a:solidFill>
+                  <a:srgbClr val="FFFF00"/>
+                </a:solidFill>
+              </a:rPr>
+              <a:t>customvisualization</a:t>
             </a:r>
             <a:endParaRPr lang="zh-TW" altLang="en-US" sz="4800" b="1" dirty="0">
               <a:solidFill>
@@ -5855,7 +5863,7 @@
             <a:fld id="{C389EDC9-19E3-47AC-9C57-C6A24DEA81AD}" type="datetime1">
               <a:rPr lang="zh-TW" altLang="en-US" smtClean="0"/>
               <a:pPr/>
-              <a:t>2019/1/7</a:t>
+              <a:t>2019/1/8</a:t>
             </a:fld>
             <a:endParaRPr lang="zh-TW" altLang="en-US"/>
           </a:p>
@@ -6033,7 +6041,15 @@
                   <a:srgbClr val="FFFF00"/>
                 </a:solidFill>
               </a:rPr>
-              <a:t>6.6 API: customization</a:t>
+              <a:t>6.6 API: </a:t>
+            </a:r>
+            <a:r>
+              <a:rPr lang="en-US" altLang="zh-TW" b="1" dirty="0" err="1">
+                <a:solidFill>
+                  <a:srgbClr val="FFFF00"/>
+                </a:solidFill>
+              </a:rPr>
+              <a:t>customvisualization</a:t>
             </a:r>
             <a:endParaRPr lang="zh-TW" altLang="en-US" b="1" dirty="0">
               <a:solidFill>
@@ -6085,8 +6101,23 @@
                 </a:solidFill>
                 <a:latin typeface="+mj-lt"/>
               </a:rPr>
-              <a:t>API: customization</a:t>
-            </a:r>
+              <a:t>API: </a:t>
+            </a:r>
+            <a:r>
+              <a:rPr lang="en-US" altLang="zh-TW" sz="1800" b="1" dirty="0" err="1">
+                <a:solidFill>
+                  <a:schemeClr val="tx1"/>
+                </a:solidFill>
+                <a:latin typeface="+mj-lt"/>
+              </a:rPr>
+              <a:t>customvisualization</a:t>
+            </a:r>
+            <a:endParaRPr lang="en-US" altLang="zh-TW" sz="1800" b="1" dirty="0">
+              <a:solidFill>
+                <a:schemeClr val="tx1"/>
+              </a:solidFill>
+              <a:latin typeface="+mj-lt"/>
+            </a:endParaRPr>
           </a:p>
           <a:p>
             <a:pPr marL="342900" indent="-342900" algn="l">
@@ -6209,7 +6240,7 @@
             <a:fld id="{A4F910E6-8D00-4BAF-8C48-9688E0B449D3}" type="datetime1">
               <a:rPr lang="zh-TW" altLang="en-US" smtClean="0"/>
               <a:pPr/>
-              <a:t>2019/1/7</a:t>
+              <a:t>2019/1/8</a:t>
             </a:fld>
             <a:endParaRPr lang="zh-TW" altLang="en-US"/>
           </a:p>
@@ -6368,7 +6399,7 @@
             <a:fld id="{C389EDC9-19E3-47AC-9C57-C6A24DEA81AD}" type="datetime1">
               <a:rPr lang="zh-TW" altLang="en-US" smtClean="0"/>
               <a:pPr/>
-              <a:t>2019/1/7</a:t>
+              <a:t>2019/1/8</a:t>
             </a:fld>
             <a:endParaRPr lang="zh-TW" altLang="en-US"/>
           </a:p>
@@ -6698,13 +6729,22 @@
               <a:buChar char="u"/>
             </a:pPr>
             <a:r>
-              <a:rPr lang="en-US" altLang="zh-TW" sz="1800" b="1" dirty="0">
+              <a:rPr lang="en-US" altLang="zh-TW" sz="1800" b="1" dirty="0" err="1">
                 <a:solidFill>
                   <a:schemeClr val="tx1"/>
                 </a:solidFill>
                 <a:latin typeface="+mj-lt"/>
               </a:rPr>
-              <a:t>Customization: NG</a:t>
+              <a:t>Customvisualization</a:t>
+            </a:r>
+            <a:r>
+              <a:rPr lang="en-US" altLang="zh-TW" sz="1800" b="1" dirty="0">
+                <a:solidFill>
+                  <a:schemeClr val="tx1"/>
+                </a:solidFill>
+                <a:latin typeface="+mj-lt"/>
+              </a:rPr>
+              <a:t>: NG</a:t>
             </a:r>
           </a:p>
         </p:txBody>
@@ -6788,7 +6828,7 @@
             <a:fld id="{A4F910E6-8D00-4BAF-8C48-9688E0B449D3}" type="datetime1">
               <a:rPr lang="zh-TW" altLang="en-US" smtClean="0"/>
               <a:pPr/>
-              <a:t>2019/1/7</a:t>
+              <a:t>2019/1/8</a:t>
             </a:fld>
             <a:endParaRPr lang="zh-TW" altLang="en-US"/>
           </a:p>
@@ -6935,7 +6975,7 @@
             <a:fld id="{4E46BE27-E923-4EC2-B046-3272AE2A3E5C}" type="datetime1">
               <a:rPr lang="zh-TW" altLang="en-US" smtClean="0"/>
               <a:pPr/>
-              <a:t>2019/1/7</a:t>
+              <a:t>2019/1/8</a:t>
             </a:fld>
             <a:endParaRPr lang="zh-TW" altLang="en-US"/>
           </a:p>
@@ -7252,7 +7292,7 @@
             <a:fld id="{A4F910E6-8D00-4BAF-8C48-9688E0B449D3}" type="datetime1">
               <a:rPr lang="zh-TW" altLang="en-US" smtClean="0"/>
               <a:pPr/>
-              <a:t>2019/1/7</a:t>
+              <a:t>2019/1/8</a:t>
             </a:fld>
             <a:endParaRPr lang="zh-TW" altLang="en-US"/>
           </a:p>
@@ -7580,7 +7620,7 @@
             <a:fld id="{A4F910E6-8D00-4BAF-8C48-9688E0B449D3}" type="datetime1">
               <a:rPr lang="zh-TW" altLang="en-US" smtClean="0"/>
               <a:pPr/>
-              <a:t>2019/1/7</a:t>
+              <a:t>2019/1/8</a:t>
             </a:fld>
             <a:endParaRPr lang="zh-TW" altLang="en-US"/>
           </a:p>
@@ -7794,7 +7834,7 @@
             <a:fld id="{C389EDC9-19E3-47AC-9C57-C6A24DEA81AD}" type="datetime1">
               <a:rPr lang="zh-TW" altLang="en-US" smtClean="0"/>
               <a:pPr/>
-              <a:t>2019/1/7</a:t>
+              <a:t>2019/1/8</a:t>
             </a:fld>
             <a:endParaRPr lang="zh-TW" altLang="en-US"/>
           </a:p>
@@ -8136,7 +8176,7 @@
             <a:fld id="{A4F910E6-8D00-4BAF-8C48-9688E0B449D3}" type="datetime1">
               <a:rPr lang="zh-TW" altLang="en-US" smtClean="0"/>
               <a:pPr/>
-              <a:t>2019/1/7</a:t>
+              <a:t>2019/1/8</a:t>
             </a:fld>
             <a:endParaRPr lang="zh-TW" altLang="en-US"/>
           </a:p>
@@ -8295,7 +8335,7 @@
             <a:fld id="{C389EDC9-19E3-47AC-9C57-C6A24DEA81AD}" type="datetime1">
               <a:rPr lang="zh-TW" altLang="en-US" smtClean="0"/>
               <a:pPr/>
-              <a:t>2019/1/7</a:t>
+              <a:t>2019/1/8</a:t>
             </a:fld>
             <a:endParaRPr lang="zh-TW" altLang="en-US"/>
           </a:p>
@@ -8614,7 +8654,7 @@
             <a:fld id="{A4F910E6-8D00-4BAF-8C48-9688E0B449D3}" type="datetime1">
               <a:rPr lang="zh-TW" altLang="en-US" smtClean="0"/>
               <a:pPr/>
-              <a:t>2019/1/7</a:t>
+              <a:t>2019/1/8</a:t>
             </a:fld>
             <a:endParaRPr lang="zh-TW" altLang="en-US"/>
           </a:p>
@@ -9188,7 +9228,7 @@
             <a:fld id="{A4F910E6-8D00-4BAF-8C48-9688E0B449D3}" type="datetime1">
               <a:rPr lang="zh-TW" altLang="en-US" smtClean="0"/>
               <a:pPr/>
-              <a:t>2019/1/7</a:t>
+              <a:t>2019/1/8</a:t>
             </a:fld>
             <a:endParaRPr lang="zh-TW" altLang="en-US"/>
           </a:p>
@@ -9495,7 +9535,7 @@
             <a:fld id="{C389EDC9-19E3-47AC-9C57-C6A24DEA81AD}" type="datetime1">
               <a:rPr lang="zh-TW" altLang="en-US" smtClean="0"/>
               <a:pPr/>
-              <a:t>2019/1/7</a:t>
+              <a:t>2019/1/8</a:t>
             </a:fld>
             <a:endParaRPr lang="zh-TW" altLang="en-US"/>
           </a:p>

</xml_diff>